<commit_message>
Added notes on TryParse and do-while
Clement's original notes on loop vocabulary are actually very similar to what I wrote in my slides, so I think I'll leave them for now.
</commit_message>
<xml_diff>
--- a/lectures/110_while_loops_and_vocabulary/While-Increment.pptx
+++ b/lectures/110_while_loops_and_vocabulary/While-Increment.pptx
@@ -5,10 +5,10 @@
     <p:sldMasterId id="2147483732" r:id="rId1"/>
   </p:sldMasterIdLst>
   <p:notesMasterIdLst>
-    <p:notesMasterId r:id="rId25"/>
+    <p:notesMasterId r:id="rId24"/>
   </p:notesMasterIdLst>
   <p:handoutMasterIdLst>
-    <p:handoutMasterId r:id="rId26"/>
+    <p:handoutMasterId r:id="rId25"/>
   </p:handoutMasterIdLst>
   <p:sldIdLst>
     <p:sldId id="256" r:id="rId2"/>
@@ -32,8 +32,7 @@
     <p:sldId id="346" r:id="rId20"/>
     <p:sldId id="347" r:id="rId21"/>
     <p:sldId id="348" r:id="rId22"/>
-    <p:sldId id="349" r:id="rId23"/>
-    <p:sldId id="350" r:id="rId24"/>
+    <p:sldId id="350" r:id="rId23"/>
   </p:sldIdLst>
   <p:sldSz cx="12188825" cy="6858000"/>
   <p:notesSz cx="6858000" cy="9144000"/>
@@ -4136,13 +4135,8 @@
           <a:p>
             <a:r>
               <a:rPr lang="en-US" dirty="0"/>
-              <a:t>Spring </a:t>
-            </a:r>
-            <a:r>
-              <a:rPr lang="en-US" dirty="0" smtClean="0"/>
-              <a:t>20XX</a:t>
-            </a:r>
-            <a:endParaRPr lang="en-US" dirty="0"/>
+              <a:t>Spring 20XX</a:t>
+            </a:r>
           </a:p>
         </p:txBody>
       </p:sp>
@@ -11861,161 +11855,6 @@
 </file>
 
 <file path=ppt/slides/slide22.xml><?xml version="1.0" encoding="utf-8"?>
-<p:sld xmlns:a="http://schemas.openxmlformats.org/drawingml/2006/main" xmlns:r="http://schemas.openxmlformats.org/officeDocument/2006/relationships" xmlns:p="http://schemas.openxmlformats.org/presentationml/2006/main">
-  <p:cSld>
-    <p:spTree>
-      <p:nvGrpSpPr>
-        <p:cNvPr id="1" name=""/>
-        <p:cNvGrpSpPr/>
-        <p:nvPr/>
-      </p:nvGrpSpPr>
-      <p:grpSpPr>
-        <a:xfrm>
-          <a:off x="0" y="0"/>
-          <a:ext cx="0" cy="0"/>
-          <a:chOff x="0" y="0"/>
-          <a:chExt cx="0" cy="0"/>
-        </a:xfrm>
-      </p:grpSpPr>
-      <p:sp>
-        <p:nvSpPr>
-          <p:cNvPr id="2" name="Title 1">
-            <a:extLst>
-              <a:ext uri="{FF2B5EF4-FFF2-40B4-BE49-F238E27FC236}">
-                <a16:creationId xmlns:a16="http://schemas.microsoft.com/office/drawing/2014/main" id="{49C9341B-41E9-4E08-866C-1EC8630CC051}"/>
-              </a:ext>
-            </a:extLst>
-          </p:cNvPr>
-          <p:cNvSpPr>
-            <a:spLocks noGrp="1"/>
-          </p:cNvSpPr>
-          <p:nvPr>
-            <p:ph type="title"/>
-          </p:nvPr>
-        </p:nvSpPr>
-        <p:spPr/>
-        <p:txBody>
-          <a:bodyPr/>
-          <a:lstStyle/>
-          <a:p>
-            <a:r>
-              <a:rPr lang="en-US" dirty="0"/>
-              <a:t>Loops and Input: Guessing Game</a:t>
-            </a:r>
-          </a:p>
-        </p:txBody>
-      </p:sp>
-      <p:sp>
-        <p:nvSpPr>
-          <p:cNvPr id="3" name="Content Placeholder 2">
-            <a:extLst>
-              <a:ext uri="{FF2B5EF4-FFF2-40B4-BE49-F238E27FC236}">
-                <a16:creationId xmlns:a16="http://schemas.microsoft.com/office/drawing/2014/main" id="{1D19355F-96F3-4FE1-A8AF-93F86E245505}"/>
-              </a:ext>
-            </a:extLst>
-          </p:cNvPr>
-          <p:cNvSpPr>
-            <a:spLocks noGrp="1"/>
-          </p:cNvSpPr>
-          <p:nvPr>
-            <p:ph idx="1"/>
-          </p:nvPr>
-        </p:nvSpPr>
-        <p:spPr/>
-        <p:txBody>
-          <a:bodyPr/>
-          <a:lstStyle/>
-          <a:p>
-            <a:r>
-              <a:rPr lang="en-US" dirty="0"/>
-              <a:t>Recall the guessing game from Lab 9:</a:t>
-            </a:r>
-          </a:p>
-          <a:p>
-            <a:pPr lvl="1"/>
-            <a:r>
-              <a:rPr lang="en-US" dirty="0"/>
-              <a:t>Ask the user to enter a number</a:t>
-            </a:r>
-          </a:p>
-          <a:p>
-            <a:pPr lvl="1"/>
-            <a:r>
-              <a:rPr lang="en-US" dirty="0"/>
-              <a:t>Display “You guessed correctly!” if it equals your favorite number</a:t>
-            </a:r>
-          </a:p>
-          <a:p>
-            <a:pPr lvl="1"/>
-            <a:r>
-              <a:rPr lang="en-US" dirty="0"/>
-              <a:t>Display “Too high!” if it’s greater than your favorite number</a:t>
-            </a:r>
-          </a:p>
-          <a:p>
-            <a:pPr lvl="1"/>
-            <a:r>
-              <a:rPr lang="en-US" dirty="0"/>
-              <a:t>Display “Too low!” if it’s less than your favorite number</a:t>
-            </a:r>
-          </a:p>
-          <a:p>
-            <a:pPr lvl="1"/>
-            <a:r>
-              <a:rPr lang="en-US" dirty="0"/>
-              <a:t>Tell the user if it is a multiple of your favorite number</a:t>
-            </a:r>
-          </a:p>
-          <a:p>
-            <a:r>
-              <a:rPr lang="en-US" dirty="0"/>
-              <a:t>Can we improve it to allow more than one guess?</a:t>
-            </a:r>
-          </a:p>
-        </p:txBody>
-      </p:sp>
-      <p:sp>
-        <p:nvSpPr>
-          <p:cNvPr id="4" name="Footer Placeholder 3">
-            <a:extLst>
-              <a:ext uri="{FF2B5EF4-FFF2-40B4-BE49-F238E27FC236}">
-                <a16:creationId xmlns:a16="http://schemas.microsoft.com/office/drawing/2014/main" id="{6A3461A8-F4B6-4101-811C-7E3E8796D776}"/>
-              </a:ext>
-            </a:extLst>
-          </p:cNvPr>
-          <p:cNvSpPr>
-            <a:spLocks noGrp="1"/>
-          </p:cNvSpPr>
-          <p:nvPr>
-            <p:ph type="ftr" sz="quarter" idx="11"/>
-          </p:nvPr>
-        </p:nvSpPr>
-        <p:spPr/>
-        <p:txBody>
-          <a:bodyPr/>
-          <a:lstStyle/>
-          <a:p>
-            <a:r>
-              <a:rPr lang="en-US"/>
-              <a:t>CSCI 1301</a:t>
-            </a:r>
-          </a:p>
-        </p:txBody>
-      </p:sp>
-    </p:spTree>
-    <p:extLst>
-      <p:ext uri="{BB962C8B-B14F-4D97-AF65-F5344CB8AC3E}">
-        <p14:creationId xmlns:p14="http://schemas.microsoft.com/office/powerpoint/2010/main" val="2225261428"/>
-      </p:ext>
-    </p:extLst>
-  </p:cSld>
-  <p:clrMapOvr>
-    <a:masterClrMapping/>
-  </p:clrMapOvr>
-</p:sld>
-</file>
-
-<file path=ppt/slides/slide23.xml><?xml version="1.0" encoding="utf-8"?>
 <p:sld xmlns:a="http://schemas.openxmlformats.org/drawingml/2006/main" xmlns:r="http://schemas.openxmlformats.org/officeDocument/2006/relationships" xmlns:p="http://schemas.openxmlformats.org/presentationml/2006/main">
   <p:cSld>
     <p:spTree>

</xml_diff>